<commit_message>
Further work on the ppt
</commit_message>
<xml_diff>
--- a/docs/Presentation/main.pptx
+++ b/docs/Presentation/main.pptx
@@ -5,7 +5,7 @@
     <p:sldMasterId id="2147483648" r:id="rId1"/>
   </p:sldMasterIdLst>
   <p:notesMasterIdLst>
-    <p:notesMasterId r:id="rId26"/>
+    <p:notesMasterId r:id="rId28"/>
   </p:notesMasterIdLst>
   <p:sldIdLst>
     <p:sldId id="256" r:id="rId2"/>
@@ -32,6 +32,8 @@
     <p:sldId id="278" r:id="rId23"/>
     <p:sldId id="279" r:id="rId24"/>
     <p:sldId id="280" r:id="rId25"/>
+    <p:sldId id="281" r:id="rId26"/>
+    <p:sldId id="282" r:id="rId27"/>
   </p:sldIdLst>
   <p:sldSz cx="12192000" cy="6858000"/>
   <p:notesSz cx="6858000" cy="9144000"/>
@@ -130,6 +132,11 @@
       </a:defRPr>
     </a:lvl9pPr>
   </p:defaultTextStyle>
+  <p:extLst>
+    <p:ext uri="{EFAFB233-063F-42B5-8137-9DF3F51BA10A}">
+      <p15:sldGuideLst xmlns:p15="http://schemas.microsoft.com/office/powerpoint/2012/main"/>
+    </p:ext>
+  </p:extLst>
 </p:presentation>
 </file>
 
@@ -4139,8 +4146,8 @@
           </a:p>
         </p:txBody>
       </p:sp>
-      <mc:AlternateContent xmlns:mc="http://schemas.openxmlformats.org/markup-compatibility/2006">
-        <mc:Choice xmlns:a14="http://schemas.microsoft.com/office/drawing/2010/main" Requires="a14">
+      <mc:AlternateContent xmlns:mc="http://schemas.openxmlformats.org/markup-compatibility/2006" xmlns:a14="http://schemas.microsoft.com/office/drawing/2010/main">
+        <mc:Choice Requires="a14">
           <p:sp>
             <p:nvSpPr>
               <p:cNvPr id="3" name="Content Placeholder 2">
@@ -4215,7 +4222,7 @@
             </p:txBody>
           </p:sp>
         </mc:Choice>
-        <mc:Fallback>
+        <mc:Fallback xmlns="">
           <p:sp>
             <p:nvSpPr>
               <p:cNvPr id="3" name="Content Placeholder 2">
@@ -4345,8 +4352,8 @@
           </a:p>
         </p:txBody>
       </p:sp>
-      <mc:AlternateContent xmlns:mc="http://schemas.openxmlformats.org/markup-compatibility/2006">
-        <mc:Choice xmlns:a14="http://schemas.microsoft.com/office/drawing/2010/main" Requires="a14">
+      <mc:AlternateContent xmlns:mc="http://schemas.openxmlformats.org/markup-compatibility/2006" xmlns:a14="http://schemas.microsoft.com/office/drawing/2010/main">
+        <mc:Choice Requires="a14">
           <p:graphicFrame>
             <p:nvGraphicFramePr>
               <p:cNvPr id="7" name="Table 6">
@@ -4582,7 +4589,7 @@
             </a:graphic>
           </p:graphicFrame>
         </mc:Choice>
-        <mc:Fallback>
+        <mc:Fallback xmlns="">
           <p:graphicFrame>
             <p:nvGraphicFramePr>
               <p:cNvPr id="7" name="Table 6">
@@ -8063,10 +8070,7 @@
             </a:r>
           </a:p>
           <a:p>
-            <a:r>
-              <a:rPr lang="en-US" dirty="0"/>
-              <a:t>Discussion.</a:t>
-            </a:r>
+            <a:endParaRPr lang="en-US" dirty="0"/>
           </a:p>
         </p:txBody>
       </p:sp>
@@ -8711,6 +8715,10 @@
             </a:r>
           </a:p>
           <a:p>
+            <a:pPr lvl="1"/>
+            <a:endParaRPr lang="en-US" dirty="0"/>
+          </a:p>
+          <a:p>
             <a:pPr lvl="2"/>
             <a:r>
               <a:rPr lang="en-US" dirty="0"/>
@@ -8809,6 +8817,36 @@
           </a:p>
         </p:txBody>
       </p:sp>
+      <p:pic>
+        <p:nvPicPr>
+          <p:cNvPr id="8" name="Picture 7">
+            <a:extLst>
+              <a:ext uri="{FF2B5EF4-FFF2-40B4-BE49-F238E27FC236}">
+                <a16:creationId xmlns:a16="http://schemas.microsoft.com/office/drawing/2014/main" id="{A4A5565F-2AFB-D7CD-690A-01666A052E26}"/>
+              </a:ext>
+            </a:extLst>
+          </p:cNvPr>
+          <p:cNvPicPr>
+            <a:picLocks noChangeAspect="1"/>
+          </p:cNvPicPr>
+          <p:nvPr/>
+        </p:nvPicPr>
+        <p:blipFill>
+          <a:blip r:embed="rId2"/>
+          <a:stretch>
+            <a:fillRect/>
+          </a:stretch>
+        </p:blipFill>
+        <p:spPr>
+          <a:xfrm>
+            <a:off x="6192448" y="3553792"/>
+            <a:ext cx="4836304" cy="1891362"/>
+          </a:xfrm>
+          <a:prstGeom prst="rect">
+            <a:avLst/>
+          </a:prstGeom>
+        </p:spPr>
+      </p:pic>
     </p:spTree>
     <p:extLst>
       <p:ext uri="{BB962C8B-B14F-4D97-AF65-F5344CB8AC3E}">
@@ -9054,7 +9092,22 @@
           <a:bodyPr/>
           <a:lstStyle/>
           <a:p>
-            <a:endParaRPr lang="en-US"/>
+            <a:r>
+              <a:rPr lang="en-US" dirty="0"/>
+              <a:t>End to End testing.</a:t>
+            </a:r>
+          </a:p>
+          <a:p>
+            <a:r>
+              <a:rPr lang="en-US" dirty="0"/>
+              <a:t>Parametrized testbench.</a:t>
+            </a:r>
+          </a:p>
+          <a:p>
+            <a:r>
+              <a:rPr lang="en-US" dirty="0"/>
+              <a:t>Self-checking.</a:t>
+            </a:r>
           </a:p>
         </p:txBody>
       </p:sp>
@@ -9141,10 +9194,492 @@
           </a:p>
         </p:txBody>
       </p:sp>
+      <p:pic>
+        <p:nvPicPr>
+          <p:cNvPr id="8" name="Picture 7">
+            <a:extLst>
+              <a:ext uri="{FF2B5EF4-FFF2-40B4-BE49-F238E27FC236}">
+                <a16:creationId xmlns:a16="http://schemas.microsoft.com/office/drawing/2014/main" id="{D69D10C7-A8BA-0BF3-B9AC-7F8A564EF2D1}"/>
+              </a:ext>
+            </a:extLst>
+          </p:cNvPr>
+          <p:cNvPicPr>
+            <a:picLocks noChangeAspect="1"/>
+          </p:cNvPicPr>
+          <p:nvPr/>
+        </p:nvPicPr>
+        <p:blipFill>
+          <a:blip r:embed="rId2">
+            <a:extLst>
+              <a:ext uri="{28A0092B-C50C-407E-A947-70E740481C1C}">
+                <a14:useLocalDpi xmlns:a14="http://schemas.microsoft.com/office/drawing/2010/main" val="0"/>
+              </a:ext>
+            </a:extLst>
+          </a:blip>
+          <a:stretch>
+            <a:fillRect/>
+          </a:stretch>
+        </p:blipFill>
+        <p:spPr>
+          <a:xfrm>
+            <a:off x="3343275" y="2887839"/>
+            <a:ext cx="8010525" cy="2933700"/>
+          </a:xfrm>
+          <a:prstGeom prst="rect">
+            <a:avLst/>
+          </a:prstGeom>
+        </p:spPr>
+      </p:pic>
     </p:spTree>
     <p:extLst>
       <p:ext uri="{BB962C8B-B14F-4D97-AF65-F5344CB8AC3E}">
         <p14:creationId xmlns:p14="http://schemas.microsoft.com/office/powerpoint/2010/main" val="2182196"/>
+      </p:ext>
+    </p:extLst>
+  </p:cSld>
+  <p:clrMapOvr>
+    <a:masterClrMapping/>
+  </p:clrMapOvr>
+</p:sld>
+</file>
+
+<file path=ppt/slides/slide25.xml><?xml version="1.0" encoding="utf-8"?>
+<p:sld xmlns:a="http://schemas.openxmlformats.org/drawingml/2006/main" xmlns:r="http://schemas.openxmlformats.org/officeDocument/2006/relationships" xmlns:p="http://schemas.openxmlformats.org/presentationml/2006/main">
+  <p:cSld>
+    <p:spTree>
+      <p:nvGrpSpPr>
+        <p:cNvPr id="1" name=""/>
+        <p:cNvGrpSpPr/>
+        <p:nvPr/>
+      </p:nvGrpSpPr>
+      <p:grpSpPr>
+        <a:xfrm>
+          <a:off x="0" y="0"/>
+          <a:ext cx="0" cy="0"/>
+          <a:chOff x="0" y="0"/>
+          <a:chExt cx="0" cy="0"/>
+        </a:xfrm>
+      </p:grpSpPr>
+      <p:sp>
+        <p:nvSpPr>
+          <p:cNvPr id="2" name="Title 1">
+            <a:extLst>
+              <a:ext uri="{FF2B5EF4-FFF2-40B4-BE49-F238E27FC236}">
+                <a16:creationId xmlns:a16="http://schemas.microsoft.com/office/drawing/2014/main" id="{A69C5278-1F91-4215-6D94-BDC2BD064437}"/>
+              </a:ext>
+            </a:extLst>
+          </p:cNvPr>
+          <p:cNvSpPr>
+            <a:spLocks noGrp="1"/>
+          </p:cNvSpPr>
+          <p:nvPr>
+            <p:ph type="title"/>
+          </p:nvPr>
+        </p:nvSpPr>
+        <p:spPr/>
+        <p:txBody>
+          <a:bodyPr/>
+          <a:lstStyle/>
+          <a:p>
+            <a:r>
+              <a:rPr lang="en-US" dirty="0"/>
+              <a:t>Testing</a:t>
+            </a:r>
+          </a:p>
+        </p:txBody>
+      </p:sp>
+      <p:sp>
+        <p:nvSpPr>
+          <p:cNvPr id="3" name="Content Placeholder 2">
+            <a:extLst>
+              <a:ext uri="{FF2B5EF4-FFF2-40B4-BE49-F238E27FC236}">
+                <a16:creationId xmlns:a16="http://schemas.microsoft.com/office/drawing/2014/main" id="{FE04D29F-4201-D327-D92D-468332CB16B8}"/>
+              </a:ext>
+            </a:extLst>
+          </p:cNvPr>
+          <p:cNvSpPr>
+            <a:spLocks noGrp="1"/>
+          </p:cNvSpPr>
+          <p:nvPr>
+            <p:ph idx="1"/>
+          </p:nvPr>
+        </p:nvSpPr>
+        <p:spPr/>
+        <p:txBody>
+          <a:bodyPr/>
+          <a:lstStyle/>
+          <a:p>
+            <a:r>
+              <a:rPr lang="en-US" dirty="0"/>
+              <a:t>The workings of the test environment can be summarized as follows:</a:t>
+            </a:r>
+          </a:p>
+          <a:p>
+            <a:pPr marL="971550" lvl="1" indent="-514350">
+              <a:buFont typeface="+mj-lt"/>
+              <a:buAutoNum type="arabicPeriod"/>
+            </a:pPr>
+            <a:r>
+              <a:rPr lang="en-US" dirty="0"/>
+              <a:t>Randomize a message.</a:t>
+            </a:r>
+          </a:p>
+          <a:p>
+            <a:pPr marL="971550" lvl="1" indent="-514350">
+              <a:buFont typeface="+mj-lt"/>
+              <a:buAutoNum type="arabicPeriod"/>
+            </a:pPr>
+            <a:r>
+              <a:rPr lang="en-US" dirty="0"/>
+              <a:t>Randomize spreading factor.</a:t>
+            </a:r>
+          </a:p>
+          <a:p>
+            <a:pPr marL="971550" lvl="1" indent="-514350">
+              <a:buFont typeface="+mj-lt"/>
+              <a:buAutoNum type="arabicPeriod"/>
+            </a:pPr>
+            <a:r>
+              <a:rPr lang="en-US" dirty="0"/>
+              <a:t>Push the message to the </a:t>
+            </a:r>
+            <a:r>
+              <a:rPr lang="en-US" b="1" dirty="0"/>
+              <a:t>TX queue</a:t>
+            </a:r>
+            <a:r>
+              <a:rPr lang="en-US" dirty="0"/>
+              <a:t>. Drive the TX module to send the message.</a:t>
+            </a:r>
+          </a:p>
+          <a:p>
+            <a:pPr marL="971550" lvl="1" indent="-514350">
+              <a:buFont typeface="+mj-lt"/>
+              <a:buAutoNum type="arabicPeriod"/>
+            </a:pPr>
+            <a:r>
+              <a:rPr lang="en-US" dirty="0"/>
+              <a:t>Iterate over the last three steps for a random amount.</a:t>
+            </a:r>
+          </a:p>
+          <a:p>
+            <a:pPr marL="971550" lvl="1" indent="-514350">
+              <a:buFont typeface="+mj-lt"/>
+              <a:buAutoNum type="arabicPeriod"/>
+            </a:pPr>
+            <a:r>
+              <a:rPr lang="en-US" dirty="0"/>
+              <a:t>Wait a random amount of clock cycles.</a:t>
+            </a:r>
+          </a:p>
+          <a:p>
+            <a:pPr marL="971550" lvl="1" indent="-514350">
+              <a:buFont typeface="+mj-lt"/>
+              <a:buAutoNum type="arabicPeriod"/>
+            </a:pPr>
+            <a:r>
+              <a:rPr lang="en-US" dirty="0"/>
+              <a:t>Monitor the </a:t>
+            </a:r>
+            <a:r>
+              <a:rPr lang="en-US" dirty="0" err="1">
+                <a:latin typeface="JetBrains Mono" panose="02000009000000000000" pitchFamily="49" charset="0"/>
+                <a:ea typeface="JetBrains Mono" panose="02000009000000000000" pitchFamily="49" charset="0"/>
+                <a:cs typeface="JetBrains Mono" panose="02000009000000000000" pitchFamily="49" charset="0"/>
+              </a:rPr>
+              <a:t>Valid_Data</a:t>
+            </a:r>
+            <a:r>
+              <a:rPr lang="en-US" dirty="0"/>
+              <a:t> output. On rising edge, pop the </a:t>
+            </a:r>
+            <a:r>
+              <a:rPr lang="en-US" b="1" dirty="0"/>
+              <a:t>TX queue </a:t>
+            </a:r>
+            <a:r>
+              <a:rPr lang="en-US" dirty="0"/>
+              <a:t>and</a:t>
+            </a:r>
+            <a:r>
+              <a:rPr lang="en-US" b="1" dirty="0"/>
+              <a:t> </a:t>
+            </a:r>
+            <a:r>
+              <a:rPr lang="en-US" dirty="0"/>
+              <a:t>compare the popped word with the demodulated word.</a:t>
+            </a:r>
+          </a:p>
+          <a:p>
+            <a:pPr marL="971550" lvl="1" indent="-514350">
+              <a:buFont typeface="+mj-lt"/>
+              <a:buAutoNum type="arabicPeriod"/>
+            </a:pPr>
+            <a:r>
+              <a:rPr lang="en-US" dirty="0"/>
+              <a:t>A match means that the system is operational.</a:t>
+            </a:r>
+          </a:p>
+        </p:txBody>
+      </p:sp>
+      <p:sp>
+        <p:nvSpPr>
+          <p:cNvPr id="4" name="Date Placeholder 3">
+            <a:extLst>
+              <a:ext uri="{FF2B5EF4-FFF2-40B4-BE49-F238E27FC236}">
+                <a16:creationId xmlns:a16="http://schemas.microsoft.com/office/drawing/2014/main" id="{DACFFF11-045D-6200-056C-47AB57403AAF}"/>
+              </a:ext>
+            </a:extLst>
+          </p:cNvPr>
+          <p:cNvSpPr>
+            <a:spLocks noGrp="1"/>
+          </p:cNvSpPr>
+          <p:nvPr>
+            <p:ph type="dt" sz="half" idx="10"/>
+          </p:nvPr>
+        </p:nvSpPr>
+        <p:spPr/>
+        <p:txBody>
+          <a:bodyPr/>
+          <a:lstStyle/>
+          <a:p>
+            <a:fld id="{E1B179BD-CB2C-43CC-9806-AEC24876569E}" type="datetime1">
+              <a:rPr lang="en-US" smtClean="0"/>
+              <a:t>12/13/2023</a:t>
+            </a:fld>
+            <a:endParaRPr lang="en-US"/>
+          </a:p>
+        </p:txBody>
+      </p:sp>
+      <p:sp>
+        <p:nvSpPr>
+          <p:cNvPr id="5" name="Footer Placeholder 4">
+            <a:extLst>
+              <a:ext uri="{FF2B5EF4-FFF2-40B4-BE49-F238E27FC236}">
+                <a16:creationId xmlns:a16="http://schemas.microsoft.com/office/drawing/2014/main" id="{867D2447-86D8-4CAD-2443-04ABC76F881E}"/>
+              </a:ext>
+            </a:extLst>
+          </p:cNvPr>
+          <p:cNvSpPr>
+            <a:spLocks noGrp="1"/>
+          </p:cNvSpPr>
+          <p:nvPr>
+            <p:ph type="ftr" sz="quarter" idx="11"/>
+          </p:nvPr>
+        </p:nvSpPr>
+        <p:spPr/>
+        <p:txBody>
+          <a:bodyPr/>
+          <a:lstStyle/>
+          <a:p>
+            <a:endParaRPr lang="en-US" dirty="0"/>
+          </a:p>
+        </p:txBody>
+      </p:sp>
+      <p:sp>
+        <p:nvSpPr>
+          <p:cNvPr id="6" name="Slide Number Placeholder 5">
+            <a:extLst>
+              <a:ext uri="{FF2B5EF4-FFF2-40B4-BE49-F238E27FC236}">
+                <a16:creationId xmlns:a16="http://schemas.microsoft.com/office/drawing/2014/main" id="{681A5A74-5722-6FCE-52FA-4D65851B9F4A}"/>
+              </a:ext>
+            </a:extLst>
+          </p:cNvPr>
+          <p:cNvSpPr>
+            <a:spLocks noGrp="1"/>
+          </p:cNvSpPr>
+          <p:nvPr>
+            <p:ph type="sldNum" sz="quarter" idx="12"/>
+          </p:nvPr>
+        </p:nvSpPr>
+        <p:spPr/>
+        <p:txBody>
+          <a:bodyPr/>
+          <a:lstStyle/>
+          <a:p>
+            <a:fld id="{B568D961-7C42-4AF1-A1CA-E4683A0210D6}" type="slidenum">
+              <a:rPr lang="en-US" smtClean="0"/>
+              <a:t>25</a:t>
+            </a:fld>
+            <a:endParaRPr lang="en-US" dirty="0"/>
+          </a:p>
+        </p:txBody>
+      </p:sp>
+    </p:spTree>
+    <p:extLst>
+      <p:ext uri="{BB962C8B-B14F-4D97-AF65-F5344CB8AC3E}">
+        <p14:creationId xmlns:p14="http://schemas.microsoft.com/office/powerpoint/2010/main" val="3447208760"/>
+      </p:ext>
+    </p:extLst>
+  </p:cSld>
+  <p:clrMapOvr>
+    <a:masterClrMapping/>
+  </p:clrMapOvr>
+</p:sld>
+</file>
+
+<file path=ppt/slides/slide26.xml><?xml version="1.0" encoding="utf-8"?>
+<p:sld xmlns:a="http://schemas.openxmlformats.org/drawingml/2006/main" xmlns:r="http://schemas.openxmlformats.org/officeDocument/2006/relationships" xmlns:p="http://schemas.openxmlformats.org/presentationml/2006/main">
+  <p:cSld>
+    <p:spTree>
+      <p:nvGrpSpPr>
+        <p:cNvPr id="1" name=""/>
+        <p:cNvGrpSpPr/>
+        <p:nvPr/>
+      </p:nvGrpSpPr>
+      <p:grpSpPr>
+        <a:xfrm>
+          <a:off x="0" y="0"/>
+          <a:ext cx="0" cy="0"/>
+          <a:chOff x="0" y="0"/>
+          <a:chExt cx="0" cy="0"/>
+        </a:xfrm>
+      </p:grpSpPr>
+      <p:sp>
+        <p:nvSpPr>
+          <p:cNvPr id="2" name="Title 1">
+            <a:extLst>
+              <a:ext uri="{FF2B5EF4-FFF2-40B4-BE49-F238E27FC236}">
+                <a16:creationId xmlns:a16="http://schemas.microsoft.com/office/drawing/2014/main" id="{7A444BF2-760E-ACFF-9D47-8CD55864F041}"/>
+              </a:ext>
+            </a:extLst>
+          </p:cNvPr>
+          <p:cNvSpPr>
+            <a:spLocks noGrp="1"/>
+          </p:cNvSpPr>
+          <p:nvPr>
+            <p:ph type="title"/>
+          </p:nvPr>
+        </p:nvSpPr>
+        <p:spPr/>
+        <p:txBody>
+          <a:bodyPr/>
+          <a:lstStyle/>
+          <a:p>
+            <a:r>
+              <a:rPr lang="en-US" dirty="0"/>
+              <a:t>Testing</a:t>
+            </a:r>
+          </a:p>
+        </p:txBody>
+      </p:sp>
+      <p:sp>
+        <p:nvSpPr>
+          <p:cNvPr id="4" name="Date Placeholder 3">
+            <a:extLst>
+              <a:ext uri="{FF2B5EF4-FFF2-40B4-BE49-F238E27FC236}">
+                <a16:creationId xmlns:a16="http://schemas.microsoft.com/office/drawing/2014/main" id="{3D007EBF-3EAA-5C86-41DB-7CFE928B1054}"/>
+              </a:ext>
+            </a:extLst>
+          </p:cNvPr>
+          <p:cNvSpPr>
+            <a:spLocks noGrp="1"/>
+          </p:cNvSpPr>
+          <p:nvPr>
+            <p:ph type="dt" sz="half" idx="10"/>
+          </p:nvPr>
+        </p:nvSpPr>
+        <p:spPr/>
+        <p:txBody>
+          <a:bodyPr/>
+          <a:lstStyle/>
+          <a:p>
+            <a:fld id="{E1B179BD-CB2C-43CC-9806-AEC24876569E}" type="datetime1">
+              <a:rPr lang="en-US" smtClean="0"/>
+              <a:t>12/13/2023</a:t>
+            </a:fld>
+            <a:endParaRPr lang="en-US"/>
+          </a:p>
+        </p:txBody>
+      </p:sp>
+      <p:sp>
+        <p:nvSpPr>
+          <p:cNvPr id="5" name="Footer Placeholder 4">
+            <a:extLst>
+              <a:ext uri="{FF2B5EF4-FFF2-40B4-BE49-F238E27FC236}">
+                <a16:creationId xmlns:a16="http://schemas.microsoft.com/office/drawing/2014/main" id="{1C4FAACC-EAAF-BE85-558B-4FEE4B5782B0}"/>
+              </a:ext>
+            </a:extLst>
+          </p:cNvPr>
+          <p:cNvSpPr>
+            <a:spLocks noGrp="1"/>
+          </p:cNvSpPr>
+          <p:nvPr>
+            <p:ph type="ftr" sz="quarter" idx="11"/>
+          </p:nvPr>
+        </p:nvSpPr>
+        <p:spPr/>
+        <p:txBody>
+          <a:bodyPr/>
+          <a:lstStyle/>
+          <a:p>
+            <a:endParaRPr lang="en-US" dirty="0"/>
+          </a:p>
+        </p:txBody>
+      </p:sp>
+      <p:sp>
+        <p:nvSpPr>
+          <p:cNvPr id="6" name="Slide Number Placeholder 5">
+            <a:extLst>
+              <a:ext uri="{FF2B5EF4-FFF2-40B4-BE49-F238E27FC236}">
+                <a16:creationId xmlns:a16="http://schemas.microsoft.com/office/drawing/2014/main" id="{2C87872F-CC2D-F7AC-347A-2DE84688AAA3}"/>
+              </a:ext>
+            </a:extLst>
+          </p:cNvPr>
+          <p:cNvSpPr>
+            <a:spLocks noGrp="1"/>
+          </p:cNvSpPr>
+          <p:nvPr>
+            <p:ph type="sldNum" sz="quarter" idx="12"/>
+          </p:nvPr>
+        </p:nvSpPr>
+        <p:spPr/>
+        <p:txBody>
+          <a:bodyPr/>
+          <a:lstStyle/>
+          <a:p>
+            <a:fld id="{B568D961-7C42-4AF1-A1CA-E4683A0210D6}" type="slidenum">
+              <a:rPr lang="en-US" smtClean="0"/>
+              <a:t>26</a:t>
+            </a:fld>
+            <a:endParaRPr lang="en-US" dirty="0"/>
+          </a:p>
+        </p:txBody>
+      </p:sp>
+      <p:pic>
+        <p:nvPicPr>
+          <p:cNvPr id="8" name="Picture 7">
+            <a:extLst>
+              <a:ext uri="{FF2B5EF4-FFF2-40B4-BE49-F238E27FC236}">
+                <a16:creationId xmlns:a16="http://schemas.microsoft.com/office/drawing/2014/main" id="{E0EE1872-21CF-20A2-A289-D5013BD17D2D}"/>
+              </a:ext>
+            </a:extLst>
+          </p:cNvPr>
+          <p:cNvPicPr>
+            <a:picLocks noChangeAspect="1"/>
+          </p:cNvPicPr>
+          <p:nvPr/>
+        </p:nvPicPr>
+        <p:blipFill>
+          <a:blip r:embed="rId2"/>
+          <a:stretch>
+            <a:fillRect/>
+          </a:stretch>
+        </p:blipFill>
+        <p:spPr>
+          <a:xfrm>
+            <a:off x="3080889" y="1893204"/>
+            <a:ext cx="6030222" cy="3820674"/>
+          </a:xfrm>
+          <a:prstGeom prst="rect">
+            <a:avLst/>
+          </a:prstGeom>
+        </p:spPr>
+      </p:pic>
+    </p:spTree>
+    <p:extLst>
+      <p:ext uri="{BB962C8B-B14F-4D97-AF65-F5344CB8AC3E}">
+        <p14:creationId xmlns:p14="http://schemas.microsoft.com/office/powerpoint/2010/main" val="2355148588"/>
       </p:ext>
     </p:extLst>
   </p:cSld>
@@ -9508,7 +10043,7 @@
                       <a:rPr lang="en-US" b="0" i="1" smtClean="0">
                         <a:latin typeface="Cambria Math" panose="02040503050406030204" pitchFamily="18" charset="0"/>
                       </a:rPr>
-                      <m:t>(</m:t>
+                      <m:t>(1−</m:t>
                     </m:r>
                     <m:sSub>
                       <m:sSubPr>
@@ -9539,7 +10074,7 @@
                       <a:rPr lang="en-US" b="0" i="1" smtClean="0">
                         <a:latin typeface="Cambria Math" panose="02040503050406030204" pitchFamily="18" charset="0"/>
                       </a:rPr>
-                      <m:t>−1)</m:t>
+                      <m:t>)</m:t>
                     </m:r>
                   </m:oMath>
                 </a14:m>
@@ -10731,8 +11266,8 @@
           </a:p>
         </p:txBody>
       </p:sp>
-      <mc:AlternateContent xmlns:mc="http://schemas.openxmlformats.org/markup-compatibility/2006">
-        <mc:Choice xmlns:a14="http://schemas.microsoft.com/office/drawing/2010/main" Requires="a14">
+      <mc:AlternateContent xmlns:mc="http://schemas.openxmlformats.org/markup-compatibility/2006" xmlns:a14="http://schemas.microsoft.com/office/drawing/2010/main">
+        <mc:Choice Requires="a14">
           <p:sp>
             <p:nvSpPr>
               <p:cNvPr id="3" name="Content Placeholder 2">
@@ -10924,7 +11459,13 @@
                             <a:rPr lang="en-US" b="0" i="1" smtClean="0">
                               <a:latin typeface="Cambria Math" panose="02040503050406030204" pitchFamily="18" charset="0"/>
                             </a:rPr>
-                            <m:t>𝑓𝑜𝑟</m:t>
+                            <m:t>𝑓</m:t>
+                          </m:r>
+                          <m:r>
+                            <a:rPr lang="en-US" b="0" i="1" smtClean="0">
+                              <a:latin typeface="Cambria Math" panose="02040503050406030204" pitchFamily="18" charset="0"/>
+                            </a:rPr>
+                            <m:t>𝑜𝑟</m:t>
                           </m:r>
                           <m:r>
                             <a:rPr lang="en-US" b="0" i="1" smtClean="0">
@@ -11248,7 +11789,7 @@
             </p:txBody>
           </p:sp>
         </mc:Choice>
-        <mc:Fallback>
+        <mc:Fallback xmlns="">
           <p:sp>
             <p:nvSpPr>
               <p:cNvPr id="3" name="Content Placeholder 2">

</xml_diff>